<commit_message>
Web Development lectures updated
</commit_message>
<xml_diff>
--- a/Web Development/Lectures/6th Week Lecture.pptx
+++ b/Web Development/Lectures/6th Week Lecture.pptx
@@ -848,7 +848,7 @@
           <a:p>
             <a:fld id="{F92B177F-34A6-4B22-B4DE-0B5E1D1AE6C4}" type="datetimeFigureOut">
               <a:rPr lang="en-US" smtClean="0"/>
-              <a:t>4/28/2024</a:t>
+              <a:t>5/5/2024</a:t>
             </a:fld>
             <a:endParaRPr lang="en-US"/>
           </a:p>
@@ -1099,7 +1099,7 @@
           <a:p>
             <a:fld id="{F92B177F-34A6-4B22-B4DE-0B5E1D1AE6C4}" type="datetimeFigureOut">
               <a:rPr lang="en-US" smtClean="0"/>
-              <a:t>4/28/2024</a:t>
+              <a:t>5/5/2024</a:t>
             </a:fld>
             <a:endParaRPr lang="en-US"/>
           </a:p>
@@ -1413,7 +1413,7 @@
           <a:p>
             <a:fld id="{F92B177F-34A6-4B22-B4DE-0B5E1D1AE6C4}" type="datetimeFigureOut">
               <a:rPr lang="en-US" smtClean="0"/>
-              <a:t>4/28/2024</a:t>
+              <a:t>5/5/2024</a:t>
             </a:fld>
             <a:endParaRPr lang="en-US"/>
           </a:p>
@@ -1754,7 +1754,7 @@
           <a:p>
             <a:fld id="{F92B177F-34A6-4B22-B4DE-0B5E1D1AE6C4}" type="datetimeFigureOut">
               <a:rPr lang="en-US" smtClean="0"/>
-              <a:t>4/28/2024</a:t>
+              <a:t>5/5/2024</a:t>
             </a:fld>
             <a:endParaRPr lang="en-US"/>
           </a:p>
@@ -2068,7 +2068,7 @@
           <a:p>
             <a:fld id="{F92B177F-34A6-4B22-B4DE-0B5E1D1AE6C4}" type="datetimeFigureOut">
               <a:rPr lang="en-US" smtClean="0"/>
-              <a:t>4/28/2024</a:t>
+              <a:t>5/5/2024</a:t>
             </a:fld>
             <a:endParaRPr lang="en-US"/>
           </a:p>
@@ -2461,7 +2461,7 @@
           <a:p>
             <a:fld id="{F92B177F-34A6-4B22-B4DE-0B5E1D1AE6C4}" type="datetimeFigureOut">
               <a:rPr lang="en-US" smtClean="0"/>
-              <a:t>4/28/2024</a:t>
+              <a:t>5/5/2024</a:t>
             </a:fld>
             <a:endParaRPr lang="en-US"/>
           </a:p>
@@ -2631,7 +2631,7 @@
           <a:p>
             <a:fld id="{F92B177F-34A6-4B22-B4DE-0B5E1D1AE6C4}" type="datetimeFigureOut">
               <a:rPr lang="en-US" smtClean="0"/>
-              <a:t>4/28/2024</a:t>
+              <a:t>5/5/2024</a:t>
             </a:fld>
             <a:endParaRPr lang="en-US"/>
           </a:p>
@@ -2811,7 +2811,7 @@
           <a:p>
             <a:fld id="{F92B177F-34A6-4B22-B4DE-0B5E1D1AE6C4}" type="datetimeFigureOut">
               <a:rPr lang="en-US" smtClean="0"/>
-              <a:t>4/28/2024</a:t>
+              <a:t>5/5/2024</a:t>
             </a:fld>
             <a:endParaRPr lang="en-US"/>
           </a:p>
@@ -2987,7 +2987,7 @@
           <a:p>
             <a:fld id="{F92B177F-34A6-4B22-B4DE-0B5E1D1AE6C4}" type="datetimeFigureOut">
               <a:rPr lang="en-US" smtClean="0"/>
-              <a:t>4/28/2024</a:t>
+              <a:t>5/5/2024</a:t>
             </a:fld>
             <a:endParaRPr lang="en-US"/>
           </a:p>
@@ -3234,7 +3234,7 @@
           <a:p>
             <a:fld id="{F92B177F-34A6-4B22-B4DE-0B5E1D1AE6C4}" type="datetimeFigureOut">
               <a:rPr lang="en-US" smtClean="0"/>
-              <a:t>4/28/2024</a:t>
+              <a:t>5/5/2024</a:t>
             </a:fld>
             <a:endParaRPr lang="en-US"/>
           </a:p>
@@ -3466,7 +3466,7 @@
           <a:p>
             <a:fld id="{F92B177F-34A6-4B22-B4DE-0B5E1D1AE6C4}" type="datetimeFigureOut">
               <a:rPr lang="en-US" smtClean="0"/>
-              <a:t>4/28/2024</a:t>
+              <a:t>5/5/2024</a:t>
             </a:fld>
             <a:endParaRPr lang="en-US"/>
           </a:p>
@@ -3840,7 +3840,7 @@
           <a:p>
             <a:fld id="{F92B177F-34A6-4B22-B4DE-0B5E1D1AE6C4}" type="datetimeFigureOut">
               <a:rPr lang="en-US" smtClean="0"/>
-              <a:t>4/28/2024</a:t>
+              <a:t>5/5/2024</a:t>
             </a:fld>
             <a:endParaRPr lang="en-US"/>
           </a:p>
@@ -3963,7 +3963,7 @@
           <a:p>
             <a:fld id="{F92B177F-34A6-4B22-B4DE-0B5E1D1AE6C4}" type="datetimeFigureOut">
               <a:rPr lang="en-US" smtClean="0"/>
-              <a:t>4/28/2024</a:t>
+              <a:t>5/5/2024</a:t>
             </a:fld>
             <a:endParaRPr lang="en-US"/>
           </a:p>
@@ -4058,7 +4058,7 @@
           <a:p>
             <a:fld id="{F92B177F-34A6-4B22-B4DE-0B5E1D1AE6C4}" type="datetimeFigureOut">
               <a:rPr lang="en-US" smtClean="0"/>
-              <a:t>4/28/2024</a:t>
+              <a:t>5/5/2024</a:t>
             </a:fld>
             <a:endParaRPr lang="en-US"/>
           </a:p>
@@ -4313,7 +4313,7 @@
           <a:p>
             <a:fld id="{F92B177F-34A6-4B22-B4DE-0B5E1D1AE6C4}" type="datetimeFigureOut">
               <a:rPr lang="en-US" smtClean="0"/>
-              <a:t>4/28/2024</a:t>
+              <a:t>5/5/2024</a:t>
             </a:fld>
             <a:endParaRPr lang="en-US"/>
           </a:p>
@@ -4576,7 +4576,7 @@
           <a:p>
             <a:fld id="{F92B177F-34A6-4B22-B4DE-0B5E1D1AE6C4}" type="datetimeFigureOut">
               <a:rPr lang="en-US" smtClean="0"/>
-              <a:t>4/28/2024</a:t>
+              <a:t>5/5/2024</a:t>
             </a:fld>
             <a:endParaRPr lang="en-US"/>
           </a:p>
@@ -5319,7 +5319,7 @@
           <a:p>
             <a:fld id="{F92B177F-34A6-4B22-B4DE-0B5E1D1AE6C4}" type="datetimeFigureOut">
               <a:rPr lang="en-US" smtClean="0"/>
-              <a:t>4/28/2024</a:t>
+              <a:t>5/5/2024</a:t>
             </a:fld>
             <a:endParaRPr lang="en-US"/>
           </a:p>
@@ -6342,7 +6342,7 @@
                   <a:schemeClr val="tx1"/>
                 </a:solidFill>
               </a:rPr>
-              <a:t>1</a:t>
+              <a:t>10</a:t>
             </a:r>
           </a:p>
         </p:txBody>
@@ -6617,7 +6617,7 @@
                   <a:schemeClr val="tx1"/>
                 </a:solidFill>
               </a:rPr>
-              <a:t>1</a:t>
+              <a:t>11</a:t>
             </a:r>
           </a:p>
         </p:txBody>
@@ -6862,7 +6862,7 @@
                   <a:schemeClr val="tx1"/>
                 </a:solidFill>
               </a:rPr>
-              <a:t>1</a:t>
+              <a:t>12</a:t>
             </a:r>
           </a:p>
         </p:txBody>
@@ -7197,7 +7197,7 @@
                   <a:schemeClr val="tx1"/>
                 </a:solidFill>
               </a:rPr>
-              <a:t>1</a:t>
+              <a:t>13</a:t>
             </a:r>
           </a:p>
         </p:txBody>
@@ -7538,7 +7538,7 @@
                   <a:schemeClr val="tx1"/>
                 </a:solidFill>
               </a:rPr>
-              <a:t>1</a:t>
+              <a:t>14</a:t>
             </a:r>
           </a:p>
         </p:txBody>
@@ -7960,7 +7960,7 @@
                   <a:schemeClr val="tx1"/>
                 </a:solidFill>
               </a:rPr>
-              <a:t>7</a:t>
+              <a:t>15</a:t>
             </a:r>
           </a:p>
         </p:txBody>
@@ -8268,7 +8268,7 @@
                   <a:schemeClr val="tx1"/>
                 </a:solidFill>
               </a:rPr>
-              <a:t>1</a:t>
+              <a:t>2</a:t>
             </a:r>
           </a:p>
         </p:txBody>
@@ -8519,7 +8519,7 @@
                   <a:schemeClr val="tx1"/>
                 </a:solidFill>
               </a:rPr>
-              <a:t>1</a:t>
+              <a:t>3</a:t>
             </a:r>
           </a:p>
         </p:txBody>
@@ -8770,7 +8770,7 @@
                   <a:schemeClr val="tx1"/>
                 </a:solidFill>
               </a:rPr>
-              <a:t>1</a:t>
+              <a:t>4</a:t>
             </a:r>
           </a:p>
         </p:txBody>
@@ -9021,7 +9021,7 @@
                   <a:schemeClr val="tx1"/>
                 </a:solidFill>
               </a:rPr>
-              <a:t>1</a:t>
+              <a:t>5</a:t>
             </a:r>
           </a:p>
         </p:txBody>
@@ -9392,7 +9392,7 @@
                   <a:schemeClr val="tx1"/>
                 </a:solidFill>
               </a:rPr>
-              <a:t>1</a:t>
+              <a:t>6</a:t>
             </a:r>
           </a:p>
         </p:txBody>
@@ -9763,7 +9763,7 @@
                   <a:schemeClr val="tx1"/>
                 </a:solidFill>
               </a:rPr>
-              <a:t>1</a:t>
+              <a:t>7</a:t>
             </a:r>
           </a:p>
         </p:txBody>
@@ -10134,7 +10134,7 @@
                   <a:schemeClr val="tx1"/>
                 </a:solidFill>
               </a:rPr>
-              <a:t>1</a:t>
+              <a:t>8</a:t>
             </a:r>
           </a:p>
         </p:txBody>
@@ -10505,7 +10505,7 @@
                   <a:schemeClr val="tx1"/>
                 </a:solidFill>
               </a:rPr>
-              <a:t>1</a:t>
+              <a:t>9</a:t>
             </a:r>
           </a:p>
         </p:txBody>

</xml_diff>